<commit_message>
Small updates in presentation
</commit_message>
<xml_diff>
--- a/2015/Web Services/Web Services - Functional testing.pptx
+++ b/2015/Web Services/Web Services - Functional testing.pptx
@@ -8622,10 +8622,22 @@
           <a:p>
             <a:pPr lvl="1"/>
             <a:r>
-              <a:rPr lang="en-US" sz="3400" dirty="0" smtClean="0"/>
+              <a:rPr lang="en-US" sz="3200" dirty="0" smtClean="0">
+                <a:hlinkClick r:id="rId2"/>
+              </a:rPr>
               <a:t>httplib2</a:t>
             </a:r>
-            <a:endParaRPr lang="en-US" sz="3400" dirty="0"/>
+            <a:endParaRPr lang="en-US" sz="3200" dirty="0" smtClean="0"/>
+          </a:p>
+          <a:p>
+            <a:pPr lvl="1"/>
+            <a:r>
+              <a:rPr lang="en-US" sz="3200" dirty="0" err="1" smtClean="0">
+                <a:hlinkClick r:id="rId3"/>
+              </a:rPr>
+              <a:t>pyresttest</a:t>
+            </a:r>
+            <a:endParaRPr lang="en-US" sz="3200" dirty="0" smtClean="0"/>
           </a:p>
           <a:p>
             <a:r>
@@ -8637,22 +8649,21 @@
           <a:p>
             <a:pPr lvl="1"/>
             <a:r>
-              <a:rPr lang="en-US" sz="3200" dirty="0"/>
-              <a:t>Rest-assured</a:t>
-            </a:r>
-          </a:p>
-          <a:p>
-            <a:pPr lvl="1"/>
-            <a:r>
-              <a:rPr lang="en-US" sz="3200" dirty="0"/>
-              <a:t>Jersey</a:t>
-            </a:r>
-            <a:endParaRPr lang="en-US" sz="3200" dirty="0" smtClean="0"/>
+              <a:rPr lang="en-US" sz="3200" dirty="0" smtClean="0">
+                <a:hlinkClick r:id="rId4"/>
+              </a:rPr>
+              <a:t>rest-assured</a:t>
+            </a:r>
+            <a:endParaRPr lang="en-US" sz="3200" dirty="0"/>
           </a:p>
           <a:p>
             <a:r>
               <a:rPr lang="en-US" sz="3600" dirty="0" smtClean="0"/>
-              <a:t>.NET</a:t>
+              <a:t>.</a:t>
+            </a:r>
+            <a:r>
+              <a:rPr lang="en-US" sz="3600" dirty="0" smtClean="0"/>
+              <a:t>NET</a:t>
             </a:r>
           </a:p>
           <a:p>

</xml_diff>